<commit_message>
Hoan tat Bai tap lon - Lap trinh Web
</commit_message>
<xml_diff>
--- a/BaoCao_PowerPoint/PP_Bao-cao_Lap-trinh-web_1551010009_LeHoangQuocBao.pptx
+++ b/BaoCao_PowerPoint/PP_Bao-cao_Lap-trinh-web_1551010009_LeHoangQuocBao.pptx
@@ -154,10 +154,25 @@
   <pc:docChgLst>
     <pc:chgData userId="f900c0729555f6cb" providerId="LiveId" clId="{42BEBE34-5664-4A62-81F2-8485EC6690C2}"/>
     <pc:docChg chg="custSel modSld">
-      <pc:chgData name="" userId="f900c0729555f6cb" providerId="LiveId" clId="{42BEBE34-5664-4A62-81F2-8485EC6690C2}" dt="2017-11-18T09:28:16.615" v="603"/>
+      <pc:chgData name="" userId="f900c0729555f6cb" providerId="LiveId" clId="{42BEBE34-5664-4A62-81F2-8485EC6690C2}" dt="2017-11-21T00:39:24.202" v="638" actId="20577"/>
       <pc:docMkLst>
         <pc:docMk/>
       </pc:docMkLst>
+      <pc:sldChg chg="modSp">
+        <pc:chgData name="" userId="f900c0729555f6cb" providerId="LiveId" clId="{42BEBE34-5664-4A62-81F2-8485EC6690C2}" dt="2017-11-21T00:39:24.202" v="638" actId="20577"/>
+        <pc:sldMkLst>
+          <pc:docMk/>
+          <pc:sldMk cId="0" sldId="256"/>
+        </pc:sldMkLst>
+        <pc:spChg chg="mod">
+          <ac:chgData name="" userId="f900c0729555f6cb" providerId="LiveId" clId="{42BEBE34-5664-4A62-81F2-8485EC6690C2}" dt="2017-11-21T00:39:24.202" v="638" actId="20577"/>
+          <ac:spMkLst>
+            <pc:docMk/>
+            <pc:sldMk cId="0" sldId="256"/>
+            <ac:spMk id="4099" creationId="{8C87FE7A-288B-4754-BE94-DE479880D30F}"/>
+          </ac:spMkLst>
+        </pc:spChg>
+      </pc:sldChg>
       <pc:sldChg chg="modSp modTransition modAnim">
         <pc:chgData name="" userId="f900c0729555f6cb" providerId="LiveId" clId="{42BEBE34-5664-4A62-81F2-8485EC6690C2}" dt="2017-11-18T09:28:16.615" v="603"/>
         <pc:sldMkLst>
@@ -284,7 +299,7 @@
               <a:pPr>
                 <a:defRPr/>
               </a:pPr>
-              <a:t>18/11/2017</a:t>
+              <a:t>21/11/2017</a:t>
             </a:fld>
             <a:endParaRPr lang="en-US"/>
           </a:p>
@@ -7807,6 +7822,17 @@
         <p:txBody>
           <a:bodyPr/>
           <a:lstStyle/>
+          <a:p>
+            <a:pPr eaLnBrk="1" hangingPunct="1"/>
+            <a:r>
+              <a:rPr lang="en-US" altLang="en-US" sz="1800" b="0">
+                <a:solidFill>
+                  <a:srgbClr val="002060"/>
+                </a:solidFill>
+              </a:rPr>
+              <a:t>GVHD: ThS. Tô Oai Hùng</a:t>
+            </a:r>
+          </a:p>
           <a:p>
             <a:pPr eaLnBrk="1" hangingPunct="1"/>
             <a:r>
@@ -10645,13 +10671,13 @@
   <p:clrMapOvr>
     <a:masterClrMapping/>
   </p:clrMapOvr>
-  <mc:AlternateContent xmlns:mc="http://schemas.openxmlformats.org/markup-compatibility/2006">
-    <mc:Choice xmlns:p15="http://schemas.microsoft.com/office/powerpoint/2012/main" Requires="p15">
+  <mc:AlternateContent xmlns:mc="http://schemas.openxmlformats.org/markup-compatibility/2006" xmlns:p15="http://schemas.microsoft.com/office/powerpoint/2012/main">
+    <mc:Choice Requires="p15">
       <p:transition xmlns:p14="http://schemas.microsoft.com/office/powerpoint/2010/main" spd="slow" p14:dur="3250">
         <p15:prstTrans prst="origami"/>
       </p:transition>
     </mc:Choice>
-    <mc:Fallback>
+    <mc:Fallback xmlns="">
       <p:transition spd="slow">
         <p:fade/>
       </p:transition>

</xml_diff>